<commit_message>
Remove author from metadata.
</commit_message>
<xml_diff>
--- a/DocumentDefinitions/reference-ictu.pptx
+++ b/DocumentDefinitions/reference-ictu.pptx
@@ -255,7 +255,7 @@
             <a:fld id="{B7EEF894-AF89-4A15-B12A-DB6EE2F8B7F6}" type="datetimeFigureOut">
               <a:rPr lang="nl-NL" smtClean="0"/>
               <a:pPr/>
-              <a:t>05-05-2021</a:t>
+              <a:t>11-04-2025</a:t>
             </a:fld>
             <a:endParaRPr lang="nl-NL"/>
           </a:p>
@@ -22160,6 +22160,17 @@
 </file>
 
 <file path=customXml/item2.xml><?xml version="1.0" encoding="utf-8"?>
+<p:properties xmlns:p="http://schemas.microsoft.com/office/2006/metadata/properties" xmlns:xsi="http://www.w3.org/2001/XMLSchema-instance" xmlns:pc="http://schemas.microsoft.com/office/infopath/2007/PartnerControls">
+  <documentManagement/>
+</p:properties>
+</file>
+
+<file path=customXml/item3.xml><?xml version="1.0" encoding="utf-8"?>
+<?mso-contentType ?>
+<SharedContentType xmlns="Microsoft.SharePoint.Taxonomy.ContentTypeSync" SourceId="a104d5ce-f540-4606-a78d-e5febbb9402b" ContentTypeId="0x010100D4D196658D17D54F87E7553811622C6B" PreviousValue="false"/>
+</file>
+
+<file path=customXml/item4.xml><?xml version="1.0" encoding="utf-8"?>
 <ct:contentTypeSchema xmlns:ct="http://schemas.microsoft.com/office/2006/metadata/contentType" xmlns:ma="http://schemas.microsoft.com/office/2006/metadata/properties/metaAttributes" ct:_="" ma:_="" ma:contentTypeName="ICTU Presentatie" ma:contentTypeID="0x010100D4D196658D17D54F87E7553811622C6B009C9A9BFC4D9691469D522035E54506E8" ma:contentTypeVersion="1" ma:contentTypeDescription="Een nieuw document maken." ma:contentTypeScope="" ma:versionID="8f537a537242c6538f5224cda8f95396">
   <xsd:schema xmlns:xsd="http://www.w3.org/2001/XMLSchema" xmlns:xs="http://www.w3.org/2001/XMLSchema" xmlns:p="http://schemas.microsoft.com/office/2006/metadata/properties" targetNamespace="http://schemas.microsoft.com/office/2006/metadata/properties" ma:root="true" ma:fieldsID="d6622ef5a77f9243412d82d131d236f0">
     <xsd:element name="properties">
@@ -22273,17 +22284,6 @@
 </ct:contentTypeSchema>
 </file>
 
-<file path=customXml/item3.xml><?xml version="1.0" encoding="utf-8"?>
-<?mso-contentType ?>
-<SharedContentType xmlns="Microsoft.SharePoint.Taxonomy.ContentTypeSync" SourceId="a104d5ce-f540-4606-a78d-e5febbb9402b" ContentTypeId="0x010100D4D196658D17D54F87E7553811622C6B" PreviousValue="false"/>
-</file>
-
-<file path=customXml/item4.xml><?xml version="1.0" encoding="utf-8"?>
-<p:properties xmlns:p="http://schemas.microsoft.com/office/2006/metadata/properties" xmlns:xsi="http://www.w3.org/2001/XMLSchema-instance" xmlns:pc="http://schemas.microsoft.com/office/infopath/2007/PartnerControls">
-  <documentManagement/>
-</p:properties>
-</file>
-
 <file path=customXml/itemProps1.xml><?xml version="1.0" encoding="utf-8"?>
 <ds:datastoreItem xmlns:ds="http://schemas.openxmlformats.org/officeDocument/2006/customXml" ds:itemID="{5BAC3184-8ECE-4BB2-98F2-8723E021E06A}">
   <ds:schemaRefs>
@@ -22293,6 +22293,29 @@
 </file>
 
 <file path=customXml/itemProps2.xml><?xml version="1.0" encoding="utf-8"?>
+<ds:datastoreItem xmlns:ds="http://schemas.openxmlformats.org/officeDocument/2006/customXml" ds:itemID="{020746DD-0BA1-4104-ADF5-772D5374F762}">
+  <ds:schemaRefs>
+    <ds:schemaRef ds:uri="http://purl.org/dc/elements/1.1/"/>
+    <ds:schemaRef ds:uri="http://schemas.openxmlformats.org/package/2006/metadata/core-properties"/>
+    <ds:schemaRef ds:uri="http://schemas.microsoft.com/office/2006/documentManagement/types"/>
+    <ds:schemaRef ds:uri="http://purl.org/dc/dcmitype/"/>
+    <ds:schemaRef ds:uri="http://www.w3.org/XML/1998/namespace"/>
+    <ds:schemaRef ds:uri="http://purl.org/dc/terms/"/>
+    <ds:schemaRef ds:uri="http://schemas.microsoft.com/office/infopath/2007/PartnerControls"/>
+    <ds:schemaRef ds:uri="http://schemas.microsoft.com/office/2006/metadata/properties"/>
+  </ds:schemaRefs>
+</ds:datastoreItem>
+</file>
+
+<file path=customXml/itemProps3.xml><?xml version="1.0" encoding="utf-8"?>
+<ds:datastoreItem xmlns:ds="http://schemas.openxmlformats.org/officeDocument/2006/customXml" ds:itemID="{42C3FC4B-462A-43EC-B479-6F67B2EC8CC5}">
+  <ds:schemaRefs>
+    <ds:schemaRef ds:uri="Microsoft.SharePoint.Taxonomy.ContentTypeSync"/>
+  </ds:schemaRefs>
+</ds:datastoreItem>
+</file>
+
+<file path=customXml/itemProps4.xml><?xml version="1.0" encoding="utf-8"?>
 <ds:datastoreItem xmlns:ds="http://schemas.openxmlformats.org/officeDocument/2006/customXml" ds:itemID="{01FC9D4A-9C2E-4076-892D-0FA6A1A093D0}">
   <ds:schemaRefs>
     <ds:schemaRef ds:uri="http://schemas.microsoft.com/office/2006/metadata/contentType"/>
@@ -22306,27 +22329,4 @@
     <ds:schemaRef ds:uri="http://schemas.microsoft.com/office/infopath/2007/PartnerControls"/>
   </ds:schemaRefs>
 </ds:datastoreItem>
-</file>
-
-<file path=customXml/itemProps3.xml><?xml version="1.0" encoding="utf-8"?>
-<ds:datastoreItem xmlns:ds="http://schemas.openxmlformats.org/officeDocument/2006/customXml" ds:itemID="{42C3FC4B-462A-43EC-B479-6F67B2EC8CC5}">
-  <ds:schemaRefs>
-    <ds:schemaRef ds:uri="Microsoft.SharePoint.Taxonomy.ContentTypeSync"/>
-  </ds:schemaRefs>
-</ds:datastoreItem>
-</file>
-
-<file path=customXml/itemProps4.xml><?xml version="1.0" encoding="utf-8"?>
-<ds:datastoreItem xmlns:ds="http://schemas.openxmlformats.org/officeDocument/2006/customXml" ds:itemID="{020746DD-0BA1-4104-ADF5-772D5374F762}">
-  <ds:schemaRefs>
-    <ds:schemaRef ds:uri="http://purl.org/dc/elements/1.1/"/>
-    <ds:schemaRef ds:uri="http://schemas.openxmlformats.org/package/2006/metadata/core-properties"/>
-    <ds:schemaRef ds:uri="http://schemas.microsoft.com/office/2006/documentManagement/types"/>
-    <ds:schemaRef ds:uri="http://purl.org/dc/dcmitype/"/>
-    <ds:schemaRef ds:uri="http://www.w3.org/XML/1998/namespace"/>
-    <ds:schemaRef ds:uri="http://purl.org/dc/terms/"/>
-    <ds:schemaRef ds:uri="http://schemas.microsoft.com/office/infopath/2007/PartnerControls"/>
-    <ds:schemaRef ds:uri="http://schemas.microsoft.com/office/2006/metadata/properties"/>
-  </ds:schemaRefs>
-</ds:datastoreItem>
 </file>
</xml_diff>